<commit_message>
Updated PowerPoint and greeter.ts file.
</commit_message>
<xml_diff>
--- a/TypeScript PowerPoint.pptx
+++ b/TypeScript PowerPoint.pptx
@@ -5,17 +5,18 @@
     <p:sldMasterId id="2147483673" r:id="rId4"/>
   </p:sldMasterIdLst>
   <p:notesMasterIdLst>
-    <p:notesMasterId r:id="rId13"/>
+    <p:notesMasterId r:id="rId14"/>
   </p:notesMasterIdLst>
   <p:sldIdLst>
     <p:sldId id="256" r:id="rId5"/>
-    <p:sldId id="257" r:id="rId6"/>
-    <p:sldId id="261" r:id="rId7"/>
-    <p:sldId id="262" r:id="rId8"/>
-    <p:sldId id="264" r:id="rId9"/>
-    <p:sldId id="265" r:id="rId10"/>
-    <p:sldId id="266" r:id="rId11"/>
-    <p:sldId id="263" r:id="rId12"/>
+    <p:sldId id="270" r:id="rId6"/>
+    <p:sldId id="269" r:id="rId7"/>
+    <p:sldId id="268" r:id="rId8"/>
+    <p:sldId id="274" r:id="rId9"/>
+    <p:sldId id="267" r:id="rId10"/>
+    <p:sldId id="271" r:id="rId11"/>
+    <p:sldId id="272" r:id="rId12"/>
+    <p:sldId id="273" r:id="rId13"/>
   </p:sldIdLst>
   <p:sldSz cx="9144000" cy="6858000" type="screen4x3"/>
   <p:notesSz cx="6858000" cy="9296400"/>
@@ -120,19 +121,20 @@
         <p14:section name="Default Section" id="{EE594107-7F7C-44D3-8383-9D6DBD88456F}">
           <p14:sldIdLst>
             <p14:sldId id="256"/>
-            <p14:sldId id="257"/>
-            <p14:sldId id="261"/>
-            <p14:sldId id="262"/>
-            <p14:sldId id="264"/>
-            <p14:sldId id="265"/>
-            <p14:sldId id="266"/>
-            <p14:sldId id="263"/>
+            <p14:sldId id="270"/>
+            <p14:sldId id="269"/>
+            <p14:sldId id="268"/>
+            <p14:sldId id="274"/>
+            <p14:sldId id="267"/>
+            <p14:sldId id="271"/>
+            <p14:sldId id="272"/>
+            <p14:sldId id="273"/>
           </p14:sldIdLst>
         </p14:section>
       </p14:sectionLst>
     </p:ext>
     <p:ext uri="{EFAFB233-063F-42B5-8137-9DF3F51BA10A}">
-      <p15:sldGuideLst xmlns:p15="http://schemas.microsoft.com/office/powerpoint/2012/main" xmlns="">
+      <p15:sldGuideLst xmlns="" xmlns:p15="http://schemas.microsoft.com/office/powerpoint/2012/main">
         <p15:guide id="1" orient="horz" pos="2160">
           <p15:clr>
             <a:srgbClr val="A4A3A4"/>
@@ -232,7 +234,7 @@
             <a:fld id="{B3950A9B-54C1-4F21-B979-9183F1804581}" type="datetimeFigureOut">
               <a:rPr lang="en-US" smtClean="0"/>
               <a:pPr/>
-              <a:t>7/19/2016</a:t>
+              <a:t>7/25/2016</a:t>
             </a:fld>
             <a:endParaRPr lang="en-US"/>
           </a:p>
@@ -634,8 +636,25 @@
           <a:bodyPr/>
           <a:lstStyle/>
           <a:p>
-            <a:r>
-              <a:rPr lang="en-US" dirty="0" err="1" smtClean="0"/>
+            <a:pPr marL="0" marR="0" indent="0" algn="l" defTabSz="914400" rtl="0" eaLnBrk="1" fontAlgn="auto" latinLnBrk="0" hangingPunct="1">
+              <a:lnSpc>
+                <a:spcPct val="100000"/>
+              </a:lnSpc>
+              <a:spcBef>
+                <a:spcPts val="0"/>
+              </a:spcBef>
+              <a:spcAft>
+                <a:spcPts val="0"/>
+              </a:spcAft>
+              <a:buClrTx/>
+              <a:buSzTx/>
+              <a:buFontTx/>
+              <a:buNone/>
+              <a:tabLst/>
+              <a:defRPr/>
+            </a:pPr>
+            <a:r>
+              <a:rPr lang="en-US" dirty="0" smtClean="0"/>
               <a:t>TypeScript</a:t>
             </a:r>
             <a:r>
@@ -648,24 +667,11 @@
             </a:r>
             <a:r>
               <a:rPr lang="en-US" baseline="0" dirty="0" smtClean="0"/>
-              <a:t> into JavaScript and doesn’t seek to replace JavaScript, only to make it better through modern ECMAScript features. It was developed by Microsoft and released to the public on October 1, 2012 at version 0.8. On its initial release the language itself was praised but there was no IDE support other than Visual Studio. This was shortly changed as more IDEs hopped on bandwagon and found ways to support </a:t>
-            </a:r>
-            <a:r>
-              <a:rPr lang="en-US" baseline="0" dirty="0" err="1" smtClean="0"/>
-              <a:t>TypeScript</a:t>
-            </a:r>
-            <a:r>
-              <a:rPr lang="en-US" baseline="0" dirty="0" smtClean="0"/>
-              <a:t>, including Microsoft with their release of Visual Studio Code that is lightweight and usable on any OS. Some other popular IDEs that have incorporated </a:t>
-            </a:r>
-            <a:r>
-              <a:rPr lang="en-US" baseline="0" dirty="0" err="1" smtClean="0"/>
-              <a:t>TypeScript</a:t>
-            </a:r>
-            <a:r>
-              <a:rPr lang="en-US" baseline="0" dirty="0" smtClean="0"/>
-              <a:t> are listed here.</a:t>
-            </a:r>
+              <a:t> into JavaScript and doesn’t seek to replace JavaScript, only to make it better through modern ECMAScript features. It was developed by Microsoft and released to the public on October 1, 2012 at version 0.8. On its initial release the language itself was praised but there was no IDE support other than Visual Studio. This was shortly changed as more IDEs hopped on bandwagon and found ways to support TypeScript, including Microsoft with their release of Visual Studio Code that is lightweight and usable on any OS. Some other popular IDEs that have incorporated TypeScript are listed here.</a:t>
+            </a:r>
+            <a:endParaRPr lang="en-US" dirty="0" smtClean="0"/>
+          </a:p>
+          <a:p>
             <a:endParaRPr lang="en-US" dirty="0"/>
           </a:p>
         </p:txBody>
@@ -697,7 +703,7 @@
     </p:spTree>
     <p:extLst>
       <p:ext uri="{BB962C8B-B14F-4D97-AF65-F5344CB8AC3E}">
-        <p14:creationId xmlns:p14="http://schemas.microsoft.com/office/powerpoint/2010/main" val="632328153"/>
+        <p14:creationId xmlns:p14="http://schemas.microsoft.com/office/powerpoint/2010/main" val="872002945"/>
       </p:ext>
     </p:extLst>
   </p:cSld>
@@ -751,27 +757,32 @@
           <a:bodyPr/>
           <a:lstStyle/>
           <a:p>
+            <a:pPr marL="0" marR="0" indent="0" algn="l" defTabSz="914400" rtl="0" eaLnBrk="1" fontAlgn="auto" latinLnBrk="0" hangingPunct="1">
+              <a:lnSpc>
+                <a:spcPct val="100000"/>
+              </a:lnSpc>
+              <a:spcBef>
+                <a:spcPts val="0"/>
+              </a:spcBef>
+              <a:spcAft>
+                <a:spcPts val="0"/>
+              </a:spcAft>
+              <a:buClrTx/>
+              <a:buSzTx/>
+              <a:buFontTx/>
+              <a:buNone/>
+              <a:tabLst/>
+              <a:defRPr/>
+            </a:pPr>
             <a:r>
               <a:rPr lang="en-US" dirty="0" smtClean="0"/>
               <a:t>First three – now  features in ECMAScript</a:t>
             </a:r>
             <a:r>
               <a:rPr lang="en-US" baseline="0" dirty="0" smtClean="0"/>
-              <a:t> 6, has been a feature in </a:t>
-            </a:r>
-            <a:r>
-              <a:rPr lang="en-US" baseline="0" dirty="0" err="1" smtClean="0"/>
-              <a:t>TypeScript</a:t>
-            </a:r>
-            <a:r>
-              <a:rPr lang="en-US" baseline="0" dirty="0" smtClean="0"/>
-              <a:t> for a long while. Error stuff speaks </a:t>
-            </a:r>
-            <a:r>
-              <a:rPr lang="en-US" baseline="0" smtClean="0"/>
-              <a:t>for itself. </a:t>
-            </a:r>
-            <a:endParaRPr lang="en-US" dirty="0"/>
+              <a:t> 6, has been a feature in TypeScript for a long while. Error stuff speaks for itself. </a:t>
+            </a:r>
+            <a:endParaRPr lang="en-US" dirty="0" smtClean="0"/>
           </a:p>
         </p:txBody>
       </p:sp>
@@ -802,7 +813,7 @@
     </p:spTree>
     <p:extLst>
       <p:ext uri="{BB962C8B-B14F-4D97-AF65-F5344CB8AC3E}">
-        <p14:creationId xmlns:p14="http://schemas.microsoft.com/office/powerpoint/2010/main" val="670210378"/>
+        <p14:creationId xmlns:p14="http://schemas.microsoft.com/office/powerpoint/2010/main" val="988052266"/>
       </p:ext>
     </p:extLst>
   </p:cSld>
@@ -856,34 +867,34 @@
           <a:bodyPr/>
           <a:lstStyle/>
           <a:p>
+            <a:pPr marL="0" marR="0" indent="0" algn="l" defTabSz="914400" rtl="0" eaLnBrk="1" fontAlgn="auto" latinLnBrk="0" hangingPunct="1">
+              <a:lnSpc>
+                <a:spcPct val="100000"/>
+              </a:lnSpc>
+              <a:spcBef>
+                <a:spcPts val="0"/>
+              </a:spcBef>
+              <a:spcAft>
+                <a:spcPts val="0"/>
+              </a:spcAft>
+              <a:buClrTx/>
+              <a:buSzTx/>
+              <a:buFontTx/>
+              <a:buNone/>
+              <a:tabLst/>
+              <a:defRPr/>
+            </a:pPr>
             <a:r>
               <a:rPr lang="en-US" dirty="0" smtClean="0"/>
-              <a:t>What does </a:t>
-            </a:r>
-            <a:r>
-              <a:rPr lang="en-US" dirty="0" err="1" smtClean="0"/>
-              <a:t>TypeScript</a:t>
-            </a:r>
-            <a:r>
-              <a:rPr lang="en-US" dirty="0" smtClean="0"/>
-              <a:t> look like? Well, it looks very</a:t>
+              <a:t>What does TypeScript look like? Well, it looks very</a:t>
             </a:r>
             <a:r>
               <a:rPr lang="en-US" baseline="0" dirty="0" smtClean="0"/>
-              <a:t> similar to JavaScript if </a:t>
-            </a:r>
-            <a:r>
-              <a:rPr lang="en-US" baseline="0" dirty="0" smtClean="0"/>
-              <a:t>you’ve </a:t>
-            </a:r>
-            <a:r>
-              <a:rPr lang="en-US" baseline="0" smtClean="0"/>
-              <a:t>worked with that in the past. </a:t>
-            </a:r>
-            <a:r>
-              <a:rPr lang="en-US" baseline="0" dirty="0" smtClean="0"/>
-              <a:t>Main difference is the typing associated that allows for real-time error detection.</a:t>
-            </a:r>
+              <a:t> similar to JavaScript if you’ve worked with that in the past. Main difference is the typing associated that allows for real-time error detection.</a:t>
+            </a:r>
+            <a:endParaRPr lang="en-US" dirty="0" smtClean="0"/>
+          </a:p>
+          <a:p>
             <a:endParaRPr lang="en-US" dirty="0"/>
           </a:p>
         </p:txBody>
@@ -906,7 +917,7 @@
             <a:fld id="{E9C23DE1-4438-443C-A508-8258C5E09A11}" type="slidenum">
               <a:rPr lang="en-US" smtClean="0"/>
               <a:pPr/>
-              <a:t>5</a:t>
+              <a:t>6</a:t>
             </a:fld>
             <a:endParaRPr lang="en-US"/>
           </a:p>
@@ -915,140 +926,7 @@
     </p:spTree>
     <p:extLst>
       <p:ext uri="{BB962C8B-B14F-4D97-AF65-F5344CB8AC3E}">
-        <p14:creationId xmlns:p14="http://schemas.microsoft.com/office/powerpoint/2010/main" val="3143064728"/>
-      </p:ext>
-    </p:extLst>
-  </p:cSld>
-  <p:clrMapOvr>
-    <a:masterClrMapping/>
-  </p:clrMapOvr>
-</p:notes>
-</file>
-
-<file path=ppt/notesSlides/notesSlide5.xml><?xml version="1.0" encoding="utf-8"?>
-<p:notes xmlns:a="http://schemas.openxmlformats.org/drawingml/2006/main" xmlns:r="http://schemas.openxmlformats.org/officeDocument/2006/relationships" xmlns:p="http://schemas.openxmlformats.org/presentationml/2006/main">
-  <p:cSld>
-    <p:spTree>
-      <p:nvGrpSpPr>
-        <p:cNvPr id="1" name=""/>
-        <p:cNvGrpSpPr/>
-        <p:nvPr/>
-      </p:nvGrpSpPr>
-      <p:grpSpPr>
-        <a:xfrm>
-          <a:off x="0" y="0"/>
-          <a:ext cx="0" cy="0"/>
-          <a:chOff x="0" y="0"/>
-          <a:chExt cx="0" cy="0"/>
-        </a:xfrm>
-      </p:grpSpPr>
-      <p:sp>
-        <p:nvSpPr>
-          <p:cNvPr id="2" name="Slide Image Placeholder 1"/>
-          <p:cNvSpPr>
-            <a:spLocks noGrp="1" noRot="1" noChangeAspect="1"/>
-          </p:cNvSpPr>
-          <p:nvPr>
-            <p:ph type="sldImg"/>
-          </p:nvPr>
-        </p:nvSpPr>
-        <p:spPr/>
-      </p:sp>
-      <p:sp>
-        <p:nvSpPr>
-          <p:cNvPr id="3" name="Notes Placeholder 2"/>
-          <p:cNvSpPr>
-            <a:spLocks noGrp="1"/>
-          </p:cNvSpPr>
-          <p:nvPr>
-            <p:ph type="body" idx="1"/>
-          </p:nvPr>
-        </p:nvSpPr>
-        <p:spPr/>
-        <p:txBody>
-          <a:bodyPr/>
-          <a:lstStyle/>
-          <a:p>
-            <a:r>
-              <a:rPr lang="en-US" dirty="0" smtClean="0"/>
-              <a:t>Start off showing them how to install Visual Studio Code and </a:t>
-            </a:r>
-            <a:r>
-              <a:rPr lang="en-US" dirty="0" err="1" smtClean="0"/>
-              <a:t>NodeJS</a:t>
-            </a:r>
-            <a:r>
-              <a:rPr lang="en-US" dirty="0" smtClean="0"/>
-              <a:t> (refresher</a:t>
-            </a:r>
-            <a:r>
-              <a:rPr lang="en-US" baseline="0" dirty="0" smtClean="0"/>
-              <a:t> from last </a:t>
-            </a:r>
-            <a:r>
-              <a:rPr lang="en-US" baseline="0" dirty="0" err="1" smtClean="0"/>
-              <a:t>LnL</a:t>
-            </a:r>
-            <a:r>
-              <a:rPr lang="en-US" baseline="0" dirty="0" smtClean="0"/>
-              <a:t>). After installing </a:t>
-            </a:r>
-            <a:r>
-              <a:rPr lang="en-US" baseline="0" dirty="0" err="1" smtClean="0"/>
-              <a:t>NodeJS</a:t>
-            </a:r>
-            <a:r>
-              <a:rPr lang="en-US" baseline="0" dirty="0" smtClean="0"/>
-              <a:t>, show them how you must modify the registry in the configuration in order to load over http instead of https. Run </a:t>
-            </a:r>
-            <a:r>
-              <a:rPr lang="en-US" baseline="0" dirty="0" err="1" smtClean="0"/>
-              <a:t>npm</a:t>
-            </a:r>
-            <a:r>
-              <a:rPr lang="en-US" baseline="0" dirty="0" smtClean="0"/>
-              <a:t> install –g typescript. </a:t>
-            </a:r>
-            <a:r>
-              <a:rPr lang="en-US" baseline="0" dirty="0" err="1" smtClean="0"/>
-              <a:t>TypeScript</a:t>
-            </a:r>
-            <a:r>
-              <a:rPr lang="en-US" baseline="0" dirty="0" smtClean="0"/>
-              <a:t> 1.8.10 will be installed. </a:t>
-            </a:r>
-            <a:endParaRPr lang="en-US" dirty="0"/>
-          </a:p>
-        </p:txBody>
-      </p:sp>
-      <p:sp>
-        <p:nvSpPr>
-          <p:cNvPr id="4" name="Slide Number Placeholder 3"/>
-          <p:cNvSpPr>
-            <a:spLocks noGrp="1"/>
-          </p:cNvSpPr>
-          <p:nvPr>
-            <p:ph type="sldNum" sz="quarter" idx="10"/>
-          </p:nvPr>
-        </p:nvSpPr>
-        <p:spPr/>
-        <p:txBody>
-          <a:bodyPr/>
-          <a:lstStyle/>
-          <a:p>
-            <a:fld id="{E9C23DE1-4438-443C-A508-8258C5E09A11}" type="slidenum">
-              <a:rPr lang="en-US" smtClean="0"/>
-              <a:pPr/>
-              <a:t>6</a:t>
-            </a:fld>
-            <a:endParaRPr lang="en-US"/>
-          </a:p>
-        </p:txBody>
-      </p:sp>
-    </p:spTree>
-    <p:extLst>
-      <p:ext uri="{BB962C8B-B14F-4D97-AF65-F5344CB8AC3E}">
-        <p14:creationId xmlns:p14="http://schemas.microsoft.com/office/powerpoint/2010/main" val="797878463"/>
+        <p14:creationId xmlns:p14="http://schemas.microsoft.com/office/powerpoint/2010/main" val="3000105500"/>
       </p:ext>
     </p:extLst>
   </p:cSld>
@@ -1262,7 +1140,7 @@
             <a:fld id="{03BDAAC0-9347-4D26-B216-AF34A331B4A7}" type="datetime1">
               <a:rPr lang="en-US" smtClean="0"/>
               <a:pPr/>
-              <a:t>7/19/2016</a:t>
+              <a:t>7/25/2016</a:t>
             </a:fld>
             <a:endParaRPr lang="en-US"/>
           </a:p>
@@ -1437,7 +1315,7 @@
             <a:fld id="{F57A0AEC-3BE2-4D46-AC07-76A9817C1F9B}" type="datetime1">
               <a:rPr lang="en-US" smtClean="0"/>
               <a:pPr/>
-              <a:t>7/19/2016</a:t>
+              <a:t>7/25/2016</a:t>
             </a:fld>
             <a:endParaRPr lang="en-US"/>
           </a:p>
@@ -1622,7 +1500,7 @@
             <a:fld id="{640FAC11-EDDE-4F11-BB10-941A3B2CFB10}" type="datetime1">
               <a:rPr lang="en-US" smtClean="0"/>
               <a:pPr/>
-              <a:t>7/19/2016</a:t>
+              <a:t>7/25/2016</a:t>
             </a:fld>
             <a:endParaRPr lang="en-US"/>
           </a:p>
@@ -1745,7 +1623,7 @@
             <a:fld id="{716C99FE-41E2-4D4A-82E9-F0AE8F1AAE39}" type="datetime1">
               <a:rPr lang="en-US" smtClean="0"/>
               <a:pPr/>
-              <a:t>7/19/2016</a:t>
+              <a:t>7/25/2016</a:t>
             </a:fld>
             <a:endParaRPr lang="en-US"/>
           </a:p>
@@ -1920,7 +1798,7 @@
             <a:fld id="{1698CB29-8FFA-48A0-828C-F3AA4ADE498B}" type="datetime1">
               <a:rPr lang="en-US" smtClean="0"/>
               <a:pPr/>
-              <a:t>7/19/2016</a:t>
+              <a:t>7/25/2016</a:t>
             </a:fld>
             <a:endParaRPr lang="en-US"/>
           </a:p>
@@ -2171,7 +2049,7 @@
             <a:fld id="{F3AD3565-6F09-46CF-9025-805F4B35B878}" type="datetime1">
               <a:rPr lang="en-US" smtClean="0"/>
               <a:pPr/>
-              <a:t>7/19/2016</a:t>
+              <a:t>7/25/2016</a:t>
             </a:fld>
             <a:endParaRPr lang="en-US"/>
           </a:p>
@@ -2464,7 +2342,7 @@
             <a:fld id="{75BBF9EE-32F6-427E-B228-D98B34043D2F}" type="datetime1">
               <a:rPr lang="en-US" smtClean="0"/>
               <a:pPr/>
-              <a:t>7/19/2016</a:t>
+              <a:t>7/25/2016</a:t>
             </a:fld>
             <a:endParaRPr lang="en-US"/>
           </a:p>
@@ -2891,7 +2769,7 @@
             <a:fld id="{D57A84B5-D77F-4780-9F0C-206D27D30BD0}" type="datetime1">
               <a:rPr lang="en-US" smtClean="0"/>
               <a:pPr/>
-              <a:t>7/19/2016</a:t>
+              <a:t>7/25/2016</a:t>
             </a:fld>
             <a:endParaRPr lang="en-US"/>
           </a:p>
@@ -3014,7 +2892,7 @@
             <a:fld id="{94DA7E42-7FBA-45B0-871C-3A059E2764B8}" type="datetime1">
               <a:rPr lang="en-US" smtClean="0"/>
               <a:pPr/>
-              <a:t>7/19/2016</a:t>
+              <a:t>7/25/2016</a:t>
             </a:fld>
             <a:endParaRPr lang="en-US"/>
           </a:p>
@@ -3114,7 +2992,7 @@
             <a:fld id="{FDEAD54B-EBA8-40B6-BD6A-77295F669A9E}" type="datetime1">
               <a:rPr lang="en-US" smtClean="0"/>
               <a:pPr/>
-              <a:t>7/19/2016</a:t>
+              <a:t>7/25/2016</a:t>
             </a:fld>
             <a:endParaRPr lang="en-US"/>
           </a:p>
@@ -3396,7 +3274,7 @@
             <a:fld id="{B1074531-6BEB-4E0B-88E4-EA5EAE77DDFB}" type="datetime1">
               <a:rPr lang="en-US" smtClean="0"/>
               <a:pPr/>
-              <a:t>7/19/2016</a:t>
+              <a:t>7/25/2016</a:t>
             </a:fld>
             <a:endParaRPr lang="en-US"/>
           </a:p>
@@ -3658,7 +3536,7 @@
             <a:fld id="{665A49A9-AF06-4D2A-9294-FB31051DDFD4}" type="datetime1">
               <a:rPr lang="en-US" smtClean="0"/>
               <a:pPr/>
-              <a:t>7/19/2016</a:t>
+              <a:t>7/25/2016</a:t>
             </a:fld>
             <a:endParaRPr lang="en-US"/>
           </a:p>
@@ -3885,7 +3763,7 @@
             <a:fld id="{3809D6EA-4289-48ED-99FE-05C6FA292073}" type="datetime1">
               <a:rPr lang="en-US" smtClean="0"/>
               <a:pPr/>
-              <a:t>7/19/2016</a:t>
+              <a:t>7/25/2016</a:t>
             </a:fld>
             <a:endParaRPr lang="en-US"/>
           </a:p>
@@ -4269,15 +4147,7 @@
                   <a:schemeClr val="bg1"/>
                 </a:solidFill>
               </a:rPr>
-              <a:t>Intro to </a:t>
-            </a:r>
-            <a:r>
-              <a:rPr lang="en-US" dirty="0" err="1" smtClean="0">
-                <a:solidFill>
-                  <a:schemeClr val="bg1"/>
-                </a:solidFill>
-              </a:rPr>
-              <a:t>TypeScript</a:t>
+              <a:t>Intro to TypeScript</a:t>
             </a:r>
             <a:endParaRPr lang="en-US" dirty="0">
               <a:solidFill>
@@ -4336,20 +4206,6 @@
 <file path=ppt/slides/slide2.xml><?xml version="1.0" encoding="utf-8"?>
 <p:sld xmlns:a="http://schemas.openxmlformats.org/drawingml/2006/main" xmlns:r="http://schemas.openxmlformats.org/officeDocument/2006/relationships" xmlns:p="http://schemas.openxmlformats.org/presentationml/2006/main">
   <p:cSld>
-    <p:bg>
-      <p:bgPr>
-        <a:blipFill dpi="0" rotWithShape="1">
-          <a:blip r:embed="rId2">
-            <a:lum/>
-          </a:blip>
-          <a:srcRect/>
-          <a:stretch>
-            <a:fillRect/>
-          </a:stretch>
-        </a:blipFill>
-        <a:effectLst/>
-      </p:bgPr>
-    </p:bg>
     <p:spTree>
       <p:nvGrpSpPr>
         <p:cNvPr id="1" name=""/>
@@ -4366,7 +4222,7 @@
       </p:grpSpPr>
       <p:sp>
         <p:nvSpPr>
-          <p:cNvPr id="2" name="Title 1"/>
+          <p:cNvPr id="8" name="Title 7"/>
           <p:cNvSpPr>
             <a:spLocks noGrp="1"/>
           </p:cNvSpPr>
@@ -4374,35 +4230,25 @@
             <p:ph type="title"/>
           </p:nvPr>
         </p:nvSpPr>
-        <p:spPr>
-          <a:xfrm>
-            <a:off x="457200" y="152400"/>
-            <a:ext cx="8229600" cy="1143000"/>
-          </a:xfrm>
-        </p:spPr>
-        <p:txBody>
-          <a:bodyPr/>
-          <a:lstStyle/>
-          <a:p>
-            <a:r>
-              <a:rPr lang="en-US" dirty="0" smtClean="0">
-                <a:solidFill>
-                  <a:srgbClr val="B3D78B"/>
+        <p:spPr/>
+        <p:txBody>
+          <a:bodyPr/>
+          <a:lstStyle/>
+          <a:p>
+            <a:r>
+              <a:rPr lang="en-US" dirty="0">
+                <a:solidFill>
+                  <a:srgbClr val="006E50"/>
                 </a:solidFill>
               </a:rPr>
               <a:t>Agenda</a:t>
             </a:r>
-            <a:endParaRPr lang="en-US" dirty="0">
-              <a:solidFill>
-                <a:srgbClr val="B3D78B"/>
-              </a:solidFill>
-            </a:endParaRPr>
-          </a:p>
-        </p:txBody>
-      </p:sp>
-      <p:sp>
-        <p:nvSpPr>
-          <p:cNvPr id="3" name="Content Placeholder 2"/>
+          </a:p>
+        </p:txBody>
+      </p:sp>
+      <p:sp>
+        <p:nvSpPr>
+          <p:cNvPr id="9" name="Content Placeholder 8"/>
           <p:cNvSpPr>
             <a:spLocks noGrp="1"/>
           </p:cNvSpPr>
@@ -4412,9 +4258,7 @@
         </p:nvSpPr>
         <p:spPr/>
         <p:txBody>
-          <a:bodyPr>
-            <a:normAutofit/>
-          </a:bodyPr>
+          <a:bodyPr/>
           <a:lstStyle/>
           <a:p>
             <a:pPr>
@@ -4423,9 +4267,9 @@
               </a:buClr>
             </a:pPr>
             <a:r>
-              <a:rPr lang="en-US" dirty="0" smtClean="0">
-                <a:solidFill>
-                  <a:srgbClr val="B3D78B"/>
+              <a:rPr lang="en-US" dirty="0">
+                <a:solidFill>
+                  <a:srgbClr val="006E50"/>
                 </a:solidFill>
               </a:rPr>
               <a:t>What is it?</a:t>
@@ -4438,9 +4282,9 @@
               </a:buClr>
             </a:pPr>
             <a:r>
-              <a:rPr lang="en-US" dirty="0" smtClean="0">
-                <a:solidFill>
-                  <a:srgbClr val="B3D78B"/>
+              <a:rPr lang="en-US" dirty="0">
+                <a:solidFill>
+                  <a:srgbClr val="006E50"/>
                 </a:solidFill>
               </a:rPr>
               <a:t>Features</a:t>
@@ -4453,9 +4297,9 @@
               </a:buClr>
             </a:pPr>
             <a:r>
-              <a:rPr lang="en-US" dirty="0" smtClean="0">
-                <a:solidFill>
-                  <a:srgbClr val="B3D78B"/>
+              <a:rPr lang="en-US" dirty="0">
+                <a:solidFill>
+                  <a:srgbClr val="006E50"/>
                 </a:solidFill>
               </a:rPr>
               <a:t>What does it look like?</a:t>
@@ -4468,9 +4312,9 @@
               </a:buClr>
             </a:pPr>
             <a:r>
-              <a:rPr lang="en-US" dirty="0" smtClean="0">
-                <a:solidFill>
-                  <a:srgbClr val="B3D78B"/>
+              <a:rPr lang="en-US" dirty="0">
+                <a:solidFill>
+                  <a:srgbClr val="006E50"/>
                 </a:solidFill>
               </a:rPr>
               <a:t>Demo</a:t>
@@ -4483,9 +4327,9 @@
               </a:buClr>
             </a:pPr>
             <a:r>
-              <a:rPr lang="en-US" dirty="0" smtClean="0">
-                <a:solidFill>
-                  <a:srgbClr val="B3D78B"/>
+              <a:rPr lang="en-US" dirty="0">
+                <a:solidFill>
+                  <a:srgbClr val="006E50"/>
                 </a:solidFill>
               </a:rPr>
               <a:t>Questions</a:t>
@@ -4498,23 +4342,24 @@
               </a:buClr>
             </a:pPr>
             <a:r>
+              <a:rPr lang="en-US" dirty="0">
+                <a:solidFill>
+                  <a:srgbClr val="006E50"/>
+                </a:solidFill>
+              </a:rPr>
+              <a:t>Tools and </a:t>
+            </a:r>
+            <a:r>
               <a:rPr lang="en-US" dirty="0" smtClean="0">
                 <a:solidFill>
-                  <a:srgbClr val="B3D78B"/>
-                </a:solidFill>
-              </a:rPr>
-              <a:t>Tools and Resources</a:t>
-            </a:r>
-          </a:p>
-          <a:p>
-            <a:pPr>
-              <a:buClr>
-                <a:srgbClr val="6AB244"/>
-              </a:buClr>
-            </a:pPr>
-            <a:endParaRPr lang="en-US" dirty="0" smtClean="0">
+                  <a:srgbClr val="006E50"/>
+                </a:solidFill>
+              </a:rPr>
+              <a:t>Resources</a:t>
+            </a:r>
+            <a:endParaRPr lang="en-US" dirty="0">
               <a:solidFill>
-                <a:srgbClr val="B3D78B"/>
+                <a:srgbClr val="006E50"/>
               </a:solidFill>
             </a:endParaRPr>
           </a:p>
@@ -4522,7 +4367,7 @@
       </p:sp>
       <p:sp>
         <p:nvSpPr>
-          <p:cNvPr id="4" name="Slide Number Placeholder 3"/>
+          <p:cNvPr id="7" name="Slide Number Placeholder 6"/>
           <p:cNvSpPr>
             <a:spLocks noGrp="1"/>
           </p:cNvSpPr>
@@ -4545,6 +4390,11 @@
         </p:txBody>
       </p:sp>
     </p:spTree>
+    <p:extLst>
+      <p:ext uri="{BB962C8B-B14F-4D97-AF65-F5344CB8AC3E}">
+        <p14:creationId xmlns:p14="http://schemas.microsoft.com/office/powerpoint/2010/main" val="2829621627"/>
+      </p:ext>
+    </p:extLst>
   </p:cSld>
   <p:clrMapOvr>
     <a:masterClrMapping/>
@@ -4562,20 +4412,6 @@
 <file path=ppt/slides/slide3.xml><?xml version="1.0" encoding="utf-8"?>
 <p:sld xmlns:a="http://schemas.openxmlformats.org/drawingml/2006/main" xmlns:r="http://schemas.openxmlformats.org/officeDocument/2006/relationships" xmlns:p="http://schemas.openxmlformats.org/presentationml/2006/main">
   <p:cSld>
-    <p:bg>
-      <p:bgPr>
-        <a:blipFill dpi="0" rotWithShape="1">
-          <a:blip r:embed="rId3">
-            <a:lum/>
-          </a:blip>
-          <a:srcRect/>
-          <a:stretch>
-            <a:fillRect/>
-          </a:stretch>
-        </a:blipFill>
-        <a:effectLst/>
-      </p:bgPr>
-    </p:bg>
     <p:spTree>
       <p:nvGrpSpPr>
         <p:cNvPr id="1" name=""/>
@@ -4592,7 +4428,7 @@
       </p:grpSpPr>
       <p:sp>
         <p:nvSpPr>
-          <p:cNvPr id="2" name="Title 1"/>
+          <p:cNvPr id="8" name="Title 7"/>
           <p:cNvSpPr>
             <a:spLocks noGrp="1"/>
           </p:cNvSpPr>
@@ -4600,86 +4436,96 @@
             <p:ph type="title"/>
           </p:nvPr>
         </p:nvSpPr>
-        <p:spPr/>
+        <p:spPr>
+          <a:xfrm>
+            <a:off x="457200" y="-76200"/>
+            <a:ext cx="8229600" cy="1143000"/>
+          </a:xfrm>
+        </p:spPr>
+        <p:txBody>
+          <a:bodyPr>
+            <a:normAutofit fontScale="90000"/>
+          </a:bodyPr>
+          <a:lstStyle/>
+          <a:p>
+            <a:r>
+              <a:rPr lang="en-US" dirty="0">
+                <a:solidFill>
+                  <a:srgbClr val="006E50"/>
+                </a:solidFill>
+              </a:rPr>
+              <a:t>What</a:t>
+            </a:r>
+            <a:r>
+              <a:rPr lang="en-US" sz="9600" dirty="0">
+                <a:solidFill>
+                  <a:srgbClr val="006E50"/>
+                </a:solidFill>
+              </a:rPr>
+              <a:t> </a:t>
+            </a:r>
+            <a:r>
+              <a:rPr lang="en-US" dirty="0">
+                <a:solidFill>
+                  <a:srgbClr val="006E50"/>
+                </a:solidFill>
+              </a:rPr>
+              <a:t>is it</a:t>
+            </a:r>
+            <a:r>
+              <a:rPr lang="en-US" dirty="0" smtClean="0">
+                <a:solidFill>
+                  <a:srgbClr val="006E50"/>
+                </a:solidFill>
+              </a:rPr>
+              <a:t>?</a:t>
+            </a:r>
+            <a:br>
+              <a:rPr lang="en-US" dirty="0" smtClean="0">
+                <a:solidFill>
+                  <a:srgbClr val="006E50"/>
+                </a:solidFill>
+              </a:rPr>
+            </a:br>
+            <a:r>
+              <a:rPr lang="en-US" sz="1100" dirty="0" smtClean="0">
+                <a:solidFill>
+                  <a:srgbClr val="006E50"/>
+                </a:solidFill>
+              </a:rPr>
+              <a:t>(</a:t>
+            </a:r>
+            <a:r>
+              <a:rPr lang="en-US" sz="1100" dirty="0">
+                <a:solidFill>
+                  <a:srgbClr val="006E50"/>
+                </a:solidFill>
+              </a:rPr>
+              <a:t>And why should I care???)</a:t>
+            </a:r>
+          </a:p>
+        </p:txBody>
+      </p:sp>
+      <p:sp>
+        <p:nvSpPr>
+          <p:cNvPr id="9" name="Content Placeholder 8"/>
+          <p:cNvSpPr>
+            <a:spLocks noGrp="1"/>
+          </p:cNvSpPr>
+          <p:nvPr>
+            <p:ph idx="1"/>
+          </p:nvPr>
+        </p:nvSpPr>
+        <p:spPr>
+          <a:xfrm>
+            <a:off x="457200" y="1189037"/>
+            <a:ext cx="8229600" cy="4525963"/>
+          </a:xfrm>
+        </p:spPr>
         <p:txBody>
           <a:bodyPr>
             <a:normAutofit/>
           </a:bodyPr>
-          <a:lstStyle/>
-          <a:p>
-            <a:r>
-              <a:rPr lang="en-US" sz="4000" dirty="0" smtClean="0">
-                <a:solidFill>
-                  <a:srgbClr val="B3D78B"/>
-                </a:solidFill>
-              </a:rPr>
-              <a:t>What is it?</a:t>
-            </a:r>
-            <a:br>
-              <a:rPr lang="en-US" sz="4000" dirty="0" smtClean="0">
-                <a:solidFill>
-                  <a:srgbClr val="B3D78B"/>
-                </a:solidFill>
-              </a:rPr>
-            </a:br>
-            <a:r>
-              <a:rPr lang="en-US" sz="1000" dirty="0" smtClean="0">
-                <a:solidFill>
-                  <a:srgbClr val="B3D78B"/>
-                </a:solidFill>
-              </a:rPr>
-              <a:t>(And why should I care???)</a:t>
-            </a:r>
-            <a:endParaRPr lang="en-US" sz="1000" dirty="0">
-              <a:solidFill>
-                <a:srgbClr val="B3D78B"/>
-              </a:solidFill>
-            </a:endParaRPr>
-          </a:p>
-        </p:txBody>
-      </p:sp>
-      <p:sp>
-        <p:nvSpPr>
-          <p:cNvPr id="4" name="Slide Number Placeholder 3"/>
-          <p:cNvSpPr>
-            <a:spLocks noGrp="1"/>
-          </p:cNvSpPr>
-          <p:nvPr>
-            <p:ph type="sldNum" sz="quarter" idx="12"/>
-          </p:nvPr>
-        </p:nvSpPr>
-        <p:spPr/>
-        <p:txBody>
-          <a:bodyPr/>
-          <a:lstStyle/>
-          <a:p>
-            <a:fld id="{BDADC32C-81AC-42FD-A247-DF363042D84D}" type="slidenum">
-              <a:rPr lang="en-US" smtClean="0"/>
-              <a:pPr/>
-              <a:t>3</a:t>
-            </a:fld>
-            <a:endParaRPr lang="en-US"/>
-          </a:p>
-        </p:txBody>
-      </p:sp>
-      <p:sp>
-        <p:nvSpPr>
-          <p:cNvPr id="10" name="Content Placeholder 9"/>
-          <p:cNvSpPr>
-            <a:spLocks noGrp="1"/>
-          </p:cNvSpPr>
-          <p:nvPr>
-            <p:ph sz="half" idx="2"/>
-          </p:nvPr>
-        </p:nvSpPr>
-        <p:spPr>
-          <a:xfrm>
-            <a:off x="571500" y="857640"/>
-            <a:ext cx="8001000" cy="5059363"/>
-          </a:xfrm>
-        </p:spPr>
-        <p:txBody>
-          <a:bodyPr/>
           <a:lstStyle/>
           <a:p>
             <a:pPr>
@@ -4687,9 +4533,86 @@
                 <a:srgbClr val="6AB244"/>
               </a:buClr>
             </a:pPr>
-            <a:endParaRPr lang="en-US" dirty="0" smtClean="0">
+            <a:r>
+              <a:rPr lang="en-US" sz="2400" dirty="0" smtClean="0">
+                <a:solidFill>
+                  <a:srgbClr val="006E50"/>
+                </a:solidFill>
+              </a:rPr>
+              <a:t>Superset </a:t>
+            </a:r>
+            <a:r>
+              <a:rPr lang="en-US" sz="2400" dirty="0">
+                <a:solidFill>
+                  <a:srgbClr val="006E50"/>
+                </a:solidFill>
+              </a:rPr>
+              <a:t>of JavaScript</a:t>
+            </a:r>
+          </a:p>
+          <a:p>
+            <a:pPr lvl="1">
+              <a:buClr>
+                <a:srgbClr val="6AB244"/>
+              </a:buClr>
+            </a:pPr>
+            <a:r>
+              <a:rPr lang="en-US" sz="2400" dirty="0">
+                <a:solidFill>
+                  <a:srgbClr val="006E50"/>
+                </a:solidFill>
+              </a:rPr>
+              <a:t>Doesn’t try to replace it – just enhances it</a:t>
+            </a:r>
+          </a:p>
+          <a:p>
+            <a:pPr lvl="1">
+              <a:buClr>
+                <a:srgbClr val="6AB244"/>
+              </a:buClr>
+            </a:pPr>
+            <a:r>
+              <a:rPr lang="en-US" sz="2400" dirty="0" err="1">
+                <a:solidFill>
+                  <a:srgbClr val="006E50"/>
+                </a:solidFill>
+              </a:rPr>
+              <a:t>Transcompiles</a:t>
+            </a:r>
+            <a:r>
+              <a:rPr lang="en-US" sz="2400" dirty="0">
+                <a:solidFill>
+                  <a:srgbClr val="006E50"/>
+                </a:solidFill>
+              </a:rPr>
+              <a:t> into JavaScript</a:t>
+            </a:r>
+          </a:p>
+          <a:p>
+            <a:pPr lvl="1">
+              <a:buClr>
+                <a:srgbClr val="6AB244"/>
+              </a:buClr>
+            </a:pPr>
+            <a:r>
+              <a:rPr lang="en-US" sz="2400" dirty="0">
+                <a:solidFill>
+                  <a:srgbClr val="006E50"/>
+                </a:solidFill>
+              </a:rPr>
+              <a:t>JavaScript WITH </a:t>
+            </a:r>
+            <a:r>
+              <a:rPr lang="en-US" sz="2400" dirty="0" err="1">
+                <a:solidFill>
+                  <a:srgbClr val="006E50"/>
+                </a:solidFill>
+              </a:rPr>
+              <a:t>Intellisense</a:t>
+            </a:r>
+            <a:endParaRPr lang="en-US" sz="2400" dirty="0">
               <a:solidFill>
-                <a:srgbClr val="B3D78B"/>
+                <a:srgbClr val="006E50"/>
               </a:solidFill>
             </a:endParaRPr>
           </a:p>
@@ -4700,84 +4623,13 @@
               </a:buClr>
             </a:pPr>
             <a:r>
-              <a:rPr lang="en-US" dirty="0" smtClean="0">
-                <a:solidFill>
-                  <a:srgbClr val="B3D78B"/>
-                </a:solidFill>
-              </a:rPr>
-              <a:t>Superset of JavaScript</a:t>
-            </a:r>
-          </a:p>
-          <a:p>
-            <a:pPr lvl="1">
-              <a:buClr>
-                <a:srgbClr val="6AB244"/>
-              </a:buClr>
-            </a:pPr>
-            <a:r>
-              <a:rPr lang="en-US" dirty="0" smtClean="0">
-                <a:solidFill>
-                  <a:srgbClr val="B3D78B"/>
-                </a:solidFill>
-              </a:rPr>
-              <a:t>Doesn’t try to replace it – just enhances it</a:t>
-            </a:r>
-            <a:endParaRPr lang="en-US" dirty="0">
-              <a:solidFill>
-                <a:srgbClr val="B3D78B"/>
-              </a:solidFill>
-            </a:endParaRPr>
-          </a:p>
-          <a:p>
-            <a:pPr lvl="1">
-              <a:buClr>
-                <a:srgbClr val="6AB244"/>
-              </a:buClr>
-            </a:pPr>
-            <a:r>
-              <a:rPr lang="en-US" dirty="0" err="1" smtClean="0">
-                <a:solidFill>
-                  <a:srgbClr val="B3D78B"/>
-                </a:solidFill>
-              </a:rPr>
-              <a:t>Transcompiles</a:t>
-            </a:r>
-            <a:r>
-              <a:rPr lang="en-US" dirty="0" smtClean="0">
-                <a:solidFill>
-                  <a:srgbClr val="B3D78B"/>
-                </a:solidFill>
-              </a:rPr>
-              <a:t> into JavaScript</a:t>
-            </a:r>
-          </a:p>
-          <a:p>
-            <a:pPr lvl="1">
-              <a:buClr>
-                <a:srgbClr val="6AB244"/>
-              </a:buClr>
-            </a:pPr>
-            <a:r>
-              <a:rPr lang="en-US" dirty="0">
-                <a:solidFill>
-                  <a:srgbClr val="B3D78B"/>
-                </a:solidFill>
-              </a:rPr>
-              <a:t>JavaScript WITH </a:t>
-            </a:r>
-            <a:r>
-              <a:rPr lang="en-US" dirty="0" err="1">
-                <a:solidFill>
-                  <a:srgbClr val="B3D78B"/>
-                </a:solidFill>
-              </a:rPr>
-              <a:t>Intellisense</a:t>
-            </a:r>
-            <a:endParaRPr lang="en-US" dirty="0" smtClean="0">
-              <a:solidFill>
-                <a:srgbClr val="B3D78B"/>
-              </a:solidFill>
-            </a:endParaRPr>
+              <a:rPr lang="en-US" sz="2400" dirty="0">
+                <a:solidFill>
+                  <a:srgbClr val="006E50"/>
+                </a:solidFill>
+              </a:rPr>
+              <a:t>Developed and supported by Microsoft</a:t>
+            </a:r>
           </a:p>
           <a:p>
             <a:pPr>
@@ -4786,61 +4638,63 @@
               </a:buClr>
             </a:pPr>
             <a:r>
-              <a:rPr lang="en-US" dirty="0">
-                <a:solidFill>
-                  <a:srgbClr val="B3D78B"/>
-                </a:solidFill>
-              </a:rPr>
-              <a:t>Developed and supported by </a:t>
-            </a:r>
-            <a:r>
-              <a:rPr lang="en-US" dirty="0" smtClean="0">
-                <a:solidFill>
-                  <a:srgbClr val="B3D78B"/>
-                </a:solidFill>
-              </a:rPr>
-              <a:t>Microsoft</a:t>
-            </a:r>
-          </a:p>
-          <a:p>
-            <a:pPr>
-              <a:buClr>
-                <a:srgbClr val="6AB244"/>
-              </a:buClr>
-            </a:pPr>
-            <a:r>
-              <a:rPr lang="en-US" dirty="0" smtClean="0">
-                <a:solidFill>
-                  <a:srgbClr val="B3D78B"/>
-                </a:solidFill>
-              </a:rPr>
-              <a:t>Large amount of support from popular IDEs:</a:t>
-            </a:r>
-          </a:p>
-          <a:p>
-            <a:pPr>
-              <a:buClr>
-                <a:srgbClr val="6AB244"/>
-              </a:buClr>
-            </a:pPr>
-            <a:endParaRPr lang="en-US" dirty="0">
+              <a:rPr lang="en-US" sz="2400" dirty="0">
+                <a:solidFill>
+                  <a:srgbClr val="006E50"/>
+                </a:solidFill>
+              </a:rPr>
+              <a:t>Large amount of support from popular IDEs</a:t>
+            </a:r>
+            <a:r>
+              <a:rPr lang="en-US" sz="2400" dirty="0" smtClean="0">
+                <a:solidFill>
+                  <a:srgbClr val="006E50"/>
+                </a:solidFill>
+              </a:rPr>
+              <a:t>:</a:t>
+            </a:r>
+            <a:endParaRPr lang="en-US" sz="2400" dirty="0">
               <a:solidFill>
-                <a:srgbClr val="B3D78B"/>
+                <a:srgbClr val="006E50"/>
               </a:solidFill>
             </a:endParaRPr>
           </a:p>
         </p:txBody>
       </p:sp>
+      <p:sp>
+        <p:nvSpPr>
+          <p:cNvPr id="7" name="Slide Number Placeholder 6"/>
+          <p:cNvSpPr>
+            <a:spLocks noGrp="1"/>
+          </p:cNvSpPr>
+          <p:nvPr>
+            <p:ph type="sldNum" sz="quarter" idx="12"/>
+          </p:nvPr>
+        </p:nvSpPr>
+        <p:spPr/>
+        <p:txBody>
+          <a:bodyPr/>
+          <a:lstStyle/>
+          <a:p>
+            <a:fld id="{BDADC32C-81AC-42FD-A247-DF363042D84D}" type="slidenum">
+              <a:rPr lang="en-US" smtClean="0"/>
+              <a:pPr/>
+              <a:t>3</a:t>
+            </a:fld>
+            <a:endParaRPr lang="en-US"/>
+          </a:p>
+        </p:txBody>
+      </p:sp>
       <p:pic>
         <p:nvPicPr>
-          <p:cNvPr id="3" name="Picture 2"/>
+          <p:cNvPr id="10" name="Picture 9"/>
           <p:cNvPicPr>
             <a:picLocks noChangeAspect="1"/>
           </p:cNvPicPr>
           <p:nvPr/>
         </p:nvPicPr>
         <p:blipFill>
-          <a:blip r:embed="rId4"/>
+          <a:blip r:embed="rId3"/>
           <a:stretch>
             <a:fillRect/>
           </a:stretch>
@@ -4856,6 +4710,11 @@
         </p:spPr>
       </p:pic>
     </p:spTree>
+    <p:extLst>
+      <p:ext uri="{BB962C8B-B14F-4D97-AF65-F5344CB8AC3E}">
+        <p14:creationId xmlns:p14="http://schemas.microsoft.com/office/powerpoint/2010/main" val="1608046983"/>
+      </p:ext>
+    </p:extLst>
   </p:cSld>
   <p:clrMapOvr>
     <a:masterClrMapping/>
@@ -4873,20 +4732,6 @@
 <file path=ppt/slides/slide4.xml><?xml version="1.0" encoding="utf-8"?>
 <p:sld xmlns:a="http://schemas.openxmlformats.org/drawingml/2006/main" xmlns:r="http://schemas.openxmlformats.org/officeDocument/2006/relationships" xmlns:p="http://schemas.openxmlformats.org/presentationml/2006/main">
   <p:cSld>
-    <p:bg>
-      <p:bgPr>
-        <a:blipFill dpi="0" rotWithShape="1">
-          <a:blip r:embed="rId3">
-            <a:lum/>
-          </a:blip>
-          <a:srcRect/>
-          <a:stretch>
-            <a:fillRect/>
-          </a:stretch>
-        </a:blipFill>
-        <a:effectLst/>
-      </p:bgPr>
-    </p:bg>
     <p:spTree>
       <p:nvGrpSpPr>
         <p:cNvPr id="1" name=""/>
@@ -4917,39 +4762,31 @@
           <a:lstStyle/>
           <a:p>
             <a:r>
-              <a:rPr lang="en-US" dirty="0" smtClean="0">
-                <a:solidFill>
-                  <a:srgbClr val="B3D78B"/>
+              <a:rPr lang="en-US" dirty="0">
+                <a:solidFill>
+                  <a:srgbClr val="006E50"/>
                 </a:solidFill>
               </a:rPr>
               <a:t>Features</a:t>
             </a:r>
-            <a:endParaRPr lang="en-US" dirty="0">
-              <a:solidFill>
-                <a:srgbClr val="B3D78B"/>
-              </a:solidFill>
-            </a:endParaRPr>
-          </a:p>
-        </p:txBody>
-      </p:sp>
-      <p:sp>
-        <p:nvSpPr>
-          <p:cNvPr id="6" name="Content Placeholder 5"/>
-          <p:cNvSpPr>
-            <a:spLocks noGrp="1"/>
-          </p:cNvSpPr>
-          <p:nvPr>
-            <p:ph sz="quarter" idx="4"/>
-          </p:nvPr>
-        </p:nvSpPr>
-        <p:spPr>
-          <a:xfrm>
-            <a:off x="533400" y="1219200"/>
-            <a:ext cx="8305800" cy="4906963"/>
-          </a:xfrm>
-        </p:spPr>
-        <p:txBody>
-          <a:bodyPr/>
+          </a:p>
+        </p:txBody>
+      </p:sp>
+      <p:sp>
+        <p:nvSpPr>
+          <p:cNvPr id="8" name="Content Placeholder 7"/>
+          <p:cNvSpPr>
+            <a:spLocks noGrp="1"/>
+          </p:cNvSpPr>
+          <p:nvPr>
+            <p:ph idx="1"/>
+          </p:nvPr>
+        </p:nvSpPr>
+        <p:spPr/>
+        <p:txBody>
+          <a:bodyPr>
+            <a:normAutofit fontScale="92500" lnSpcReduction="20000"/>
+          </a:bodyPr>
           <a:lstStyle/>
           <a:p>
             <a:pPr>
@@ -4958,9 +4795,9 @@
               </a:buClr>
             </a:pPr>
             <a:r>
-              <a:rPr lang="en-US" dirty="0" smtClean="0">
-                <a:solidFill>
-                  <a:srgbClr val="B3D78B"/>
+              <a:rPr lang="en-US" dirty="0">
+                <a:solidFill>
+                  <a:srgbClr val="006E50"/>
                 </a:solidFill>
               </a:rPr>
               <a:t>Utilize classes</a:t>
@@ -4973,9 +4810,9 @@
               </a:buClr>
             </a:pPr>
             <a:r>
-              <a:rPr lang="en-US" dirty="0" smtClean="0">
-                <a:solidFill>
-                  <a:srgbClr val="B3D78B"/>
+              <a:rPr lang="en-US" dirty="0">
+                <a:solidFill>
+                  <a:srgbClr val="006E50"/>
                 </a:solidFill>
               </a:rPr>
               <a:t>Arrow function syntax</a:t>
@@ -4988,9 +4825,9 @@
               </a:buClr>
             </a:pPr>
             <a:r>
-              <a:rPr lang="en-US" dirty="0" smtClean="0">
-                <a:solidFill>
-                  <a:srgbClr val="B3D78B"/>
+              <a:rPr lang="en-US" dirty="0">
+                <a:solidFill>
+                  <a:srgbClr val="006E50"/>
                 </a:solidFill>
               </a:rPr>
               <a:t>Optional parameters</a:t>
@@ -5005,7 +4842,7 @@
             <a:r>
               <a:rPr lang="en-US" dirty="0">
                 <a:solidFill>
-                  <a:srgbClr val="B3D78B"/>
+                  <a:srgbClr val="006E50"/>
                 </a:solidFill>
               </a:rPr>
               <a:t>Find errors in development, not in testing</a:t>
@@ -5020,7 +4857,7 @@
             <a:r>
               <a:rPr lang="en-US" dirty="0">
                 <a:solidFill>
-                  <a:srgbClr val="B3D78B"/>
+                  <a:srgbClr val="006E50"/>
                 </a:solidFill>
               </a:rPr>
               <a:t>Compile-Time type checking</a:t>
@@ -5033,17 +4870,17 @@
               </a:buClr>
             </a:pPr>
             <a:r>
-              <a:rPr lang="en-US" dirty="0" err="1" smtClean="0">
-                <a:solidFill>
-                  <a:srgbClr val="B3D78B"/>
+              <a:rPr lang="en-US" dirty="0" err="1">
+                <a:solidFill>
+                  <a:srgbClr val="006E50"/>
                 </a:solidFill>
               </a:rPr>
               <a:t>Intellisense</a:t>
             </a:r>
             <a:r>
-              <a:rPr lang="en-US" dirty="0" smtClean="0">
-                <a:solidFill>
-                  <a:srgbClr val="B3D78B"/>
+              <a:rPr lang="en-US" dirty="0">
+                <a:solidFill>
+                  <a:srgbClr val="006E50"/>
                 </a:solidFill>
               </a:rPr>
               <a:t> error reporting</a:t>
@@ -5056,9 +4893,9 @@
               </a:buClr>
             </a:pPr>
             <a:r>
-              <a:rPr lang="en-US" dirty="0" smtClean="0">
-                <a:solidFill>
-                  <a:srgbClr val="B3D78B"/>
+              <a:rPr lang="en-US" dirty="0">
+                <a:solidFill>
+                  <a:srgbClr val="006E50"/>
                 </a:solidFill>
               </a:rPr>
               <a:t>Namespaces</a:t>
@@ -5071,17 +4908,17 @@
               </a:buClr>
             </a:pPr>
             <a:r>
-              <a:rPr lang="en-US" dirty="0" err="1" smtClean="0">
-                <a:solidFill>
-                  <a:srgbClr val="B3D78B"/>
+              <a:rPr lang="en-US" dirty="0" err="1">
+                <a:solidFill>
+                  <a:srgbClr val="006E50"/>
                 </a:solidFill>
               </a:rPr>
               <a:t>Asynch</a:t>
             </a:r>
             <a:r>
-              <a:rPr lang="en-US" dirty="0" smtClean="0">
-                <a:solidFill>
-                  <a:srgbClr val="B3D78B"/>
+              <a:rPr lang="en-US" dirty="0">
+                <a:solidFill>
+                  <a:srgbClr val="006E50"/>
                 </a:solidFill>
               </a:rPr>
               <a:t>/Await</a:t>
@@ -5094,9 +4931,9 @@
               </a:buClr>
             </a:pPr>
             <a:r>
-              <a:rPr lang="en-US" dirty="0" smtClean="0">
-                <a:solidFill>
-                  <a:srgbClr val="B3D78B"/>
+              <a:rPr lang="en-US" dirty="0">
+                <a:solidFill>
+                  <a:srgbClr val="006E50"/>
                 </a:solidFill>
               </a:rPr>
               <a:t>Interfaces</a:t>
@@ -5109,13 +4946,26 @@
               </a:buClr>
             </a:pPr>
             <a:r>
+              <a:rPr lang="en-US" dirty="0">
+                <a:solidFill>
+                  <a:srgbClr val="006E50"/>
+                </a:solidFill>
+              </a:rPr>
+              <a:t>Type </a:t>
+            </a:r>
+            <a:r>
               <a:rPr lang="en-US" dirty="0" smtClean="0">
                 <a:solidFill>
-                  <a:srgbClr val="B3D78B"/>
-                </a:solidFill>
-              </a:rPr>
-              <a:t>Type inference</a:t>
-            </a:r>
+                  <a:srgbClr val="006E50"/>
+                </a:solidFill>
+              </a:rPr>
+              <a:t>inference</a:t>
+            </a:r>
+            <a:endParaRPr lang="en-US" dirty="0">
+              <a:solidFill>
+                <a:srgbClr val="006E50"/>
+              </a:solidFill>
+            </a:endParaRPr>
           </a:p>
         </p:txBody>
       </p:sp>
@@ -5144,6 +4994,11 @@
         </p:txBody>
       </p:sp>
     </p:spTree>
+    <p:extLst>
+      <p:ext uri="{BB962C8B-B14F-4D97-AF65-F5344CB8AC3E}">
+        <p14:creationId xmlns:p14="http://schemas.microsoft.com/office/powerpoint/2010/main" val="3316010680"/>
+      </p:ext>
+    </p:extLst>
   </p:cSld>
   <p:clrMapOvr>
     <a:masterClrMapping/>
@@ -5161,20 +5016,6 @@
 <file path=ppt/slides/slide5.xml><?xml version="1.0" encoding="utf-8"?>
 <p:sld xmlns:a="http://schemas.openxmlformats.org/drawingml/2006/main" xmlns:r="http://schemas.openxmlformats.org/officeDocument/2006/relationships" xmlns:p="http://schemas.openxmlformats.org/presentationml/2006/main">
   <p:cSld>
-    <p:bg>
-      <p:bgPr>
-        <a:blipFill dpi="0" rotWithShape="1">
-          <a:blip r:embed="rId3">
-            <a:lum/>
-          </a:blip>
-          <a:srcRect/>
-          <a:stretch>
-            <a:fillRect/>
-          </a:stretch>
-        </a:blipFill>
-        <a:effectLst/>
-      </p:bgPr>
-    </p:bg>
     <p:spTree>
       <p:nvGrpSpPr>
         <p:cNvPr id="1" name=""/>
@@ -5201,86 +5042,183 @@
         </p:nvSpPr>
         <p:spPr/>
         <p:txBody>
+          <a:bodyPr/>
+          <a:lstStyle/>
+          <a:p>
+            <a:r>
+              <a:rPr lang="en-US" dirty="0" smtClean="0">
+                <a:solidFill>
+                  <a:srgbClr val="006E50"/>
+                </a:solidFill>
+              </a:rPr>
+              <a:t>JavaScript Decision Tree</a:t>
+            </a:r>
+            <a:endParaRPr lang="en-US" dirty="0">
+              <a:solidFill>
+                <a:srgbClr val="006E50"/>
+              </a:solidFill>
+            </a:endParaRPr>
+          </a:p>
+        </p:txBody>
+      </p:sp>
+      <p:sp>
+        <p:nvSpPr>
+          <p:cNvPr id="3" name="Content Placeholder 2"/>
+          <p:cNvSpPr>
+            <a:spLocks noGrp="1"/>
+          </p:cNvSpPr>
+          <p:nvPr>
+            <p:ph idx="1"/>
+          </p:nvPr>
+        </p:nvSpPr>
+        <p:spPr/>
+        <p:txBody>
           <a:bodyPr>
             <a:normAutofit/>
           </a:bodyPr>
           <a:lstStyle/>
           <a:p>
+            <a:pPr>
+              <a:buClr>
+                <a:srgbClr val="6AB244"/>
+              </a:buClr>
+            </a:pPr>
             <a:r>
               <a:rPr lang="en-US" dirty="0" smtClean="0">
                 <a:solidFill>
-                  <a:srgbClr val="B3D78B"/>
-                </a:solidFill>
-              </a:rPr>
-              <a:t>What does it look like? </a:t>
+                  <a:srgbClr val="006E50"/>
+                </a:solidFill>
+              </a:rPr>
+              <a:t>Do </a:t>
+            </a:r>
+            <a:r>
+              <a:rPr lang="en-US" dirty="0">
+                <a:solidFill>
+                  <a:srgbClr val="006E50"/>
+                </a:solidFill>
+              </a:rPr>
+              <a:t>you mind having a build step?</a:t>
+            </a:r>
+          </a:p>
+          <a:p>
+            <a:pPr lvl="1">
+              <a:buClr>
+                <a:srgbClr val="6AB244"/>
+              </a:buClr>
+            </a:pPr>
+            <a:r>
+              <a:rPr lang="en-US" dirty="0">
+                <a:solidFill>
+                  <a:srgbClr val="006E50"/>
+                </a:solidFill>
+              </a:rPr>
+              <a:t>Yes - </a:t>
+            </a:r>
+            <a:r>
+              <a:rPr lang="en-US" b="1" dirty="0">
+                <a:solidFill>
+                  <a:srgbClr val="006E50"/>
+                </a:solidFill>
+              </a:rPr>
+              <a:t>Use ES5</a:t>
             </a:r>
             <a:endParaRPr lang="en-US" dirty="0">
               <a:solidFill>
-                <a:srgbClr val="B3D78B"/>
+                <a:srgbClr val="006E50"/>
               </a:solidFill>
             </a:endParaRPr>
           </a:p>
-        </p:txBody>
-      </p:sp>
-      <p:sp>
-        <p:nvSpPr>
-          <p:cNvPr id="3" name="Text Placeholder 2"/>
-          <p:cNvSpPr>
-            <a:spLocks noGrp="1"/>
-          </p:cNvSpPr>
-          <p:nvPr>
-            <p:ph type="body" idx="1"/>
-          </p:nvPr>
-        </p:nvSpPr>
-        <p:spPr/>
-        <p:txBody>
-          <a:bodyPr/>
-          <a:lstStyle/>
-          <a:p>
-            <a:pPr algn="ctr"/>
-            <a:r>
-              <a:rPr lang="en-US" dirty="0" smtClean="0">
-                <a:solidFill>
-                  <a:srgbClr val="B3D78B"/>
-                </a:solidFill>
-              </a:rPr>
-              <a:t>JavaScript</a:t>
+          <a:p>
+            <a:pPr lvl="1">
+              <a:buClr>
+                <a:srgbClr val="6AB244"/>
+              </a:buClr>
+            </a:pPr>
+            <a:r>
+              <a:rPr lang="en-US" dirty="0">
+                <a:solidFill>
+                  <a:srgbClr val="006E50"/>
+                </a:solidFill>
+              </a:rPr>
+              <a:t>No - keep going</a:t>
+            </a:r>
+          </a:p>
+          <a:p>
+            <a:pPr>
+              <a:buClr>
+                <a:srgbClr val="6AB244"/>
+              </a:buClr>
+            </a:pPr>
+            <a:r>
+              <a:rPr lang="en-US" dirty="0">
+                <a:solidFill>
+                  <a:srgbClr val="006E50"/>
+                </a:solidFill>
+              </a:rPr>
+              <a:t>Do you want to use types?</a:t>
+            </a:r>
+          </a:p>
+          <a:p>
+            <a:pPr lvl="1">
+              <a:buClr>
+                <a:srgbClr val="6AB244"/>
+              </a:buClr>
+            </a:pPr>
+            <a:r>
+              <a:rPr lang="en-US" dirty="0">
+                <a:solidFill>
+                  <a:srgbClr val="006E50"/>
+                </a:solidFill>
+              </a:rPr>
+              <a:t>Yes - </a:t>
+            </a:r>
+            <a:r>
+              <a:rPr lang="en-US" b="1" dirty="0">
+                <a:solidFill>
+                  <a:srgbClr val="006E50"/>
+                </a:solidFill>
+              </a:rPr>
+              <a:t>Use TypeScript</a:t>
             </a:r>
             <a:endParaRPr lang="en-US" dirty="0">
               <a:solidFill>
-                <a:srgbClr val="B3D78B"/>
+                <a:srgbClr val="006E50"/>
               </a:solidFill>
             </a:endParaRPr>
           </a:p>
-        </p:txBody>
-      </p:sp>
-      <p:sp>
-        <p:nvSpPr>
-          <p:cNvPr id="5" name="Text Placeholder 4"/>
-          <p:cNvSpPr>
-            <a:spLocks noGrp="1"/>
-          </p:cNvSpPr>
-          <p:nvPr>
-            <p:ph type="body" sz="quarter" idx="3"/>
-          </p:nvPr>
-        </p:nvSpPr>
-        <p:spPr/>
-        <p:txBody>
-          <a:bodyPr/>
-          <a:lstStyle/>
-          <a:p>
-            <a:pPr algn="ctr"/>
-            <a:r>
-              <a:rPr lang="en-US" dirty="0" err="1">
-                <a:solidFill>
-                  <a:srgbClr val="B3D78B"/>
-                </a:solidFill>
-              </a:rPr>
-              <a:t>TypeScript</a:t>
+          <a:p>
+            <a:pPr lvl="1">
+              <a:buClr>
+                <a:srgbClr val="6AB244"/>
+              </a:buClr>
+            </a:pPr>
+            <a:r>
+              <a:rPr lang="en-US" dirty="0">
+                <a:solidFill>
+                  <a:srgbClr val="006E50"/>
+                </a:solidFill>
+              </a:rPr>
+              <a:t>No - </a:t>
+            </a:r>
+            <a:r>
+              <a:rPr lang="en-US" b="1" dirty="0">
+                <a:solidFill>
+                  <a:srgbClr val="006E50"/>
+                </a:solidFill>
+              </a:rPr>
+              <a:t>Use </a:t>
+            </a:r>
+            <a:r>
+              <a:rPr lang="en-US" b="1" dirty="0" smtClean="0">
+                <a:solidFill>
+                  <a:srgbClr val="006E50"/>
+                </a:solidFill>
+              </a:rPr>
+              <a:t>ES6</a:t>
             </a:r>
             <a:endParaRPr lang="en-US" dirty="0">
               <a:solidFill>
-                <a:srgbClr val="B3D78B"/>
+                <a:srgbClr val="006E50"/>
               </a:solidFill>
             </a:endParaRPr>
           </a:p>
@@ -5288,7 +5226,7 @@
       </p:sp>
       <p:sp>
         <p:nvSpPr>
-          <p:cNvPr id="7" name="Slide Number Placeholder 6"/>
+          <p:cNvPr id="4" name="Slide Number Placeholder 3"/>
           <p:cNvSpPr>
             <a:spLocks noGrp="1"/>
           </p:cNvSpPr>
@@ -5310,9 +5248,160 @@
           </a:p>
         </p:txBody>
       </p:sp>
+    </p:spTree>
+    <p:extLst>
+      <p:ext uri="{BB962C8B-B14F-4D97-AF65-F5344CB8AC3E}">
+        <p14:creationId xmlns:p14="http://schemas.microsoft.com/office/powerpoint/2010/main" val="3239695071"/>
+      </p:ext>
+    </p:extLst>
+  </p:cSld>
+  <p:clrMapOvr>
+    <a:masterClrMapping/>
+  </p:clrMapOvr>
+  <p:timing>
+    <p:tnLst>
+      <p:par>
+        <p:cTn id="1" dur="indefinite" restart="never" nodeType="tmRoot"/>
+      </p:par>
+    </p:tnLst>
+  </p:timing>
+</p:sld>
+</file>
+
+<file path=ppt/slides/slide6.xml><?xml version="1.0" encoding="utf-8"?>
+<p:sld xmlns:a="http://schemas.openxmlformats.org/drawingml/2006/main" xmlns:r="http://schemas.openxmlformats.org/officeDocument/2006/relationships" xmlns:p="http://schemas.openxmlformats.org/presentationml/2006/main">
+  <p:cSld>
+    <p:spTree>
+      <p:nvGrpSpPr>
+        <p:cNvPr id="1" name=""/>
+        <p:cNvGrpSpPr/>
+        <p:nvPr/>
+      </p:nvGrpSpPr>
+      <p:grpSpPr>
+        <a:xfrm>
+          <a:off x="0" y="0"/>
+          <a:ext cx="0" cy="0"/>
+          <a:chOff x="0" y="0"/>
+          <a:chExt cx="0" cy="0"/>
+        </a:xfrm>
+      </p:grpSpPr>
+      <p:sp>
+        <p:nvSpPr>
+          <p:cNvPr id="2" name="Title 1"/>
+          <p:cNvSpPr>
+            <a:spLocks noGrp="1"/>
+          </p:cNvSpPr>
+          <p:nvPr>
+            <p:ph type="title"/>
+          </p:nvPr>
+        </p:nvSpPr>
+        <p:spPr/>
+        <p:txBody>
+          <a:bodyPr/>
+          <a:lstStyle/>
+          <a:p>
+            <a:r>
+              <a:rPr lang="en-US" dirty="0">
+                <a:solidFill>
+                  <a:srgbClr val="006E50"/>
+                </a:solidFill>
+              </a:rPr>
+              <a:t>What does it look like? </a:t>
+            </a:r>
+          </a:p>
+        </p:txBody>
+      </p:sp>
+      <p:sp>
+        <p:nvSpPr>
+          <p:cNvPr id="3" name="Text Placeholder 2"/>
+          <p:cNvSpPr>
+            <a:spLocks noGrp="1"/>
+          </p:cNvSpPr>
+          <p:nvPr>
+            <p:ph type="body" idx="1"/>
+          </p:nvPr>
+        </p:nvSpPr>
+        <p:spPr/>
+        <p:txBody>
+          <a:bodyPr/>
+          <a:lstStyle/>
+          <a:p>
+            <a:pPr algn="ctr"/>
+            <a:r>
+              <a:rPr lang="en-US" dirty="0" smtClean="0">
+                <a:solidFill>
+                  <a:srgbClr val="006E50"/>
+                </a:solidFill>
+              </a:rPr>
+              <a:t>JavaScript</a:t>
+            </a:r>
+            <a:endParaRPr lang="en-US" dirty="0">
+              <a:solidFill>
+                <a:srgbClr val="006E50"/>
+              </a:solidFill>
+            </a:endParaRPr>
+          </a:p>
+        </p:txBody>
+      </p:sp>
+      <p:sp>
+        <p:nvSpPr>
+          <p:cNvPr id="5" name="Text Placeholder 4"/>
+          <p:cNvSpPr>
+            <a:spLocks noGrp="1"/>
+          </p:cNvSpPr>
+          <p:nvPr>
+            <p:ph type="body" sz="quarter" idx="3"/>
+          </p:nvPr>
+        </p:nvSpPr>
+        <p:spPr/>
+        <p:txBody>
+          <a:bodyPr/>
+          <a:lstStyle/>
+          <a:p>
+            <a:pPr algn="ctr"/>
+            <a:r>
+              <a:rPr lang="en-US" dirty="0" smtClean="0">
+                <a:solidFill>
+                  <a:srgbClr val="006E50"/>
+                </a:solidFill>
+              </a:rPr>
+              <a:t>TypeScript</a:t>
+            </a:r>
+            <a:endParaRPr lang="en-US" dirty="0">
+              <a:solidFill>
+                <a:srgbClr val="006E50"/>
+              </a:solidFill>
+            </a:endParaRPr>
+          </a:p>
+        </p:txBody>
+      </p:sp>
+      <p:sp>
+        <p:nvSpPr>
+          <p:cNvPr id="7" name="Slide Number Placeholder 6"/>
+          <p:cNvSpPr>
+            <a:spLocks noGrp="1"/>
+          </p:cNvSpPr>
+          <p:nvPr>
+            <p:ph type="sldNum" sz="quarter" idx="12"/>
+          </p:nvPr>
+        </p:nvSpPr>
+        <p:spPr/>
+        <p:txBody>
+          <a:bodyPr/>
+          <a:lstStyle/>
+          <a:p>
+            <a:fld id="{BDADC32C-81AC-42FD-A247-DF363042D84D}" type="slidenum">
+              <a:rPr lang="en-US" smtClean="0"/>
+              <a:pPr/>
+              <a:t>6</a:t>
+            </a:fld>
+            <a:endParaRPr lang="en-US"/>
+          </a:p>
+        </p:txBody>
+      </p:sp>
       <p:pic>
         <p:nvPicPr>
-          <p:cNvPr id="1026" name="Picture 2"/>
+          <p:cNvPr id="8" name="Picture 2"/>
           <p:cNvPicPr>
             <a:picLocks noGrp="1" noChangeAspect="1" noChangeArrowheads="1"/>
           </p:cNvPicPr>
@@ -5321,7 +5410,7 @@
           </p:nvPr>
         </p:nvPicPr>
         <p:blipFill>
-          <a:blip r:embed="rId4">
+          <a:blip r:embed="rId3">
             <a:extLst>
               <a:ext uri="{28A0092B-C50C-407E-A947-70E740481C1C}">
                 <a14:useLocalDpi xmlns:a14="http://schemas.microsoft.com/office/drawing/2010/main" val="0"/>
@@ -5368,7 +5457,7 @@
       </p:pic>
       <p:pic>
         <p:nvPicPr>
-          <p:cNvPr id="1027" name="Picture 3"/>
+          <p:cNvPr id="9" name="Picture 3"/>
           <p:cNvPicPr>
             <a:picLocks noGrp="1" noChangeAspect="1" noChangeArrowheads="1"/>
           </p:cNvPicPr>
@@ -5377,7 +5466,7 @@
           </p:nvPr>
         </p:nvPicPr>
         <p:blipFill>
-          <a:blip r:embed="rId5">
+          <a:blip r:embed="rId4">
             <a:extLst>
               <a:ext uri="{28A0092B-C50C-407E-A947-70E740481C1C}">
                 <a14:useLocalDpi xmlns:a14="http://schemas.microsoft.com/office/drawing/2010/main" val="0"/>
@@ -5423,112 +5512,11 @@
         </p:spPr>
       </p:pic>
     </p:spTree>
-  </p:cSld>
-  <p:clrMapOvr>
-    <a:masterClrMapping/>
-  </p:clrMapOvr>
-  <p:timing>
-    <p:tnLst>
-      <p:par>
-        <p:cTn id="1" dur="indefinite" restart="never" nodeType="tmRoot"/>
-      </p:par>
-    </p:tnLst>
-  </p:timing>
-</p:sld>
-</file>
-
-<file path=ppt/slides/slide6.xml><?xml version="1.0" encoding="utf-8"?>
-<p:sld xmlns:a="http://schemas.openxmlformats.org/drawingml/2006/main" xmlns:r="http://schemas.openxmlformats.org/officeDocument/2006/relationships" xmlns:p="http://schemas.openxmlformats.org/presentationml/2006/main">
-  <p:cSld>
-    <p:bg>
-      <p:bgPr>
-        <a:blipFill dpi="0" rotWithShape="1">
-          <a:blip r:embed="rId3">
-            <a:lum/>
-          </a:blip>
-          <a:srcRect/>
-          <a:stretch>
-            <a:fillRect/>
-          </a:stretch>
-        </a:blipFill>
-        <a:effectLst/>
-      </p:bgPr>
-    </p:bg>
-    <p:spTree>
-      <p:nvGrpSpPr>
-        <p:cNvPr id="1" name=""/>
-        <p:cNvGrpSpPr/>
-        <p:nvPr/>
-      </p:nvGrpSpPr>
-      <p:grpSpPr>
-        <a:xfrm>
-          <a:off x="0" y="0"/>
-          <a:ext cx="0" cy="0"/>
-          <a:chOff x="0" y="0"/>
-          <a:chExt cx="0" cy="0"/>
-        </a:xfrm>
-      </p:grpSpPr>
-      <p:sp>
-        <p:nvSpPr>
-          <p:cNvPr id="2" name="Title 1"/>
-          <p:cNvSpPr>
-            <a:spLocks noGrp="1"/>
-          </p:cNvSpPr>
-          <p:nvPr>
-            <p:ph type="title"/>
-          </p:nvPr>
-        </p:nvSpPr>
-        <p:spPr>
-          <a:xfrm>
-            <a:off x="457200" y="2286000"/>
-            <a:ext cx="8229600" cy="1143000"/>
-          </a:xfrm>
-        </p:spPr>
-        <p:txBody>
-          <a:bodyPr/>
-          <a:lstStyle/>
-          <a:p>
-            <a:r>
-              <a:rPr lang="en-US" dirty="0" smtClean="0">
-                <a:solidFill>
-                  <a:srgbClr val="B3D78B"/>
-                </a:solidFill>
-              </a:rPr>
-              <a:t>Demo</a:t>
-            </a:r>
-            <a:endParaRPr lang="en-US" dirty="0">
-              <a:solidFill>
-                <a:srgbClr val="B3D78B"/>
-              </a:solidFill>
-            </a:endParaRPr>
-          </a:p>
-        </p:txBody>
-      </p:sp>
-      <p:sp>
-        <p:nvSpPr>
-          <p:cNvPr id="7" name="Slide Number Placeholder 6"/>
-          <p:cNvSpPr>
-            <a:spLocks noGrp="1"/>
-          </p:cNvSpPr>
-          <p:nvPr>
-            <p:ph type="sldNum" sz="quarter" idx="12"/>
-          </p:nvPr>
-        </p:nvSpPr>
-        <p:spPr/>
-        <p:txBody>
-          <a:bodyPr/>
-          <a:lstStyle/>
-          <a:p>
-            <a:fld id="{BDADC32C-81AC-42FD-A247-DF363042D84D}" type="slidenum">
-              <a:rPr lang="en-US" smtClean="0"/>
-              <a:pPr/>
-              <a:t>6</a:t>
-            </a:fld>
-            <a:endParaRPr lang="en-US"/>
-          </a:p>
-        </p:txBody>
-      </p:sp>
-    </p:spTree>
+    <p:extLst>
+      <p:ext uri="{BB962C8B-B14F-4D97-AF65-F5344CB8AC3E}">
+        <p14:creationId xmlns:p14="http://schemas.microsoft.com/office/powerpoint/2010/main" val="2377949944"/>
+      </p:ext>
+    </p:extLst>
   </p:cSld>
   <p:clrMapOvr>
     <a:masterClrMapping/>
@@ -5546,20 +5534,6 @@
 <file path=ppt/slides/slide7.xml><?xml version="1.0" encoding="utf-8"?>
 <p:sld xmlns:a="http://schemas.openxmlformats.org/drawingml/2006/main" xmlns:r="http://schemas.openxmlformats.org/officeDocument/2006/relationships" xmlns:p="http://schemas.openxmlformats.org/presentationml/2006/main">
   <p:cSld>
-    <p:bg>
-      <p:bgPr>
-        <a:blipFill dpi="0" rotWithShape="1">
-          <a:blip r:embed="rId2">
-            <a:lum/>
-          </a:blip>
-          <a:srcRect/>
-          <a:stretch>
-            <a:fillRect/>
-          </a:stretch>
-        </a:blipFill>
-        <a:effectLst/>
-      </p:bgPr>
-    </p:bg>
     <p:spTree>
       <p:nvGrpSpPr>
         <p:cNvPr id="1" name=""/>
@@ -5576,7 +5550,7 @@
       </p:grpSpPr>
       <p:sp>
         <p:nvSpPr>
-          <p:cNvPr id="2" name="Title 1"/>
+          <p:cNvPr id="8" name="Title 7"/>
           <p:cNvSpPr>
             <a:spLocks noGrp="1"/>
           </p:cNvSpPr>
@@ -5586,7 +5560,7 @@
         </p:nvSpPr>
         <p:spPr>
           <a:xfrm>
-            <a:off x="457200" y="2286000"/>
+            <a:off x="457200" y="2667000"/>
             <a:ext cx="8229600" cy="1143000"/>
           </a:xfrm>
         </p:spPr>
@@ -5595,18 +5569,13 @@
           <a:lstStyle/>
           <a:p>
             <a:r>
-              <a:rPr lang="en-US" dirty="0" smtClean="0">
-                <a:solidFill>
-                  <a:srgbClr val="B3D78B"/>
-                </a:solidFill>
-              </a:rPr>
-              <a:t>Questions?</a:t>
-            </a:r>
-            <a:endParaRPr lang="en-US" dirty="0">
-              <a:solidFill>
-                <a:srgbClr val="B3D78B"/>
-              </a:solidFill>
-            </a:endParaRPr>
+              <a:rPr lang="en-US" dirty="0">
+                <a:solidFill>
+                  <a:srgbClr val="006E50"/>
+                </a:solidFill>
+              </a:rPr>
+              <a:t>Demo</a:t>
+            </a:r>
           </a:p>
         </p:txBody>
       </p:sp>
@@ -5637,7 +5606,7 @@
     </p:spTree>
     <p:extLst>
       <p:ext uri="{BB962C8B-B14F-4D97-AF65-F5344CB8AC3E}">
-        <p14:creationId xmlns:p14="http://schemas.microsoft.com/office/powerpoint/2010/main" val="3328510485"/>
+        <p14:creationId xmlns:p14="http://schemas.microsoft.com/office/powerpoint/2010/main" val="2737681342"/>
       </p:ext>
     </p:extLst>
   </p:cSld>
@@ -5657,20 +5626,6 @@
 <file path=ppt/slides/slide8.xml><?xml version="1.0" encoding="utf-8"?>
 <p:sld xmlns:a="http://schemas.openxmlformats.org/drawingml/2006/main" xmlns:r="http://schemas.openxmlformats.org/officeDocument/2006/relationships" xmlns:p="http://schemas.openxmlformats.org/presentationml/2006/main">
   <p:cSld>
-    <p:bg>
-      <p:bgPr>
-        <a:blipFill dpi="0" rotWithShape="1">
-          <a:blip r:embed="rId2">
-            <a:lum/>
-          </a:blip>
-          <a:srcRect/>
-          <a:stretch>
-            <a:fillRect/>
-          </a:stretch>
-        </a:blipFill>
-        <a:effectLst/>
-      </p:bgPr>
-    </p:bg>
     <p:spTree>
       <p:nvGrpSpPr>
         <p:cNvPr id="1" name=""/>
@@ -5695,7 +5650,12 @@
             <p:ph type="title"/>
           </p:nvPr>
         </p:nvSpPr>
-        <p:spPr/>
+        <p:spPr>
+          <a:xfrm>
+            <a:off x="457200" y="2667000"/>
+            <a:ext cx="8229600" cy="1143000"/>
+          </a:xfrm>
+        </p:spPr>
         <p:txBody>
           <a:bodyPr/>
           <a:lstStyle/>
@@ -5703,14 +5663,14 @@
             <a:r>
               <a:rPr lang="en-US" dirty="0" smtClean="0">
                 <a:solidFill>
-                  <a:srgbClr val="B3D78B"/>
-                </a:solidFill>
-              </a:rPr>
-              <a:t>Tools &amp; Resources</a:t>
+                  <a:srgbClr val="006E50"/>
+                </a:solidFill>
+              </a:rPr>
+              <a:t>Questions?</a:t>
             </a:r>
             <a:endParaRPr lang="en-US" dirty="0">
               <a:solidFill>
-                <a:srgbClr val="B3D78B"/>
+                <a:srgbClr val="006E50"/>
               </a:solidFill>
             </a:endParaRPr>
           </a:p>
@@ -5718,22 +5678,116 @@
       </p:sp>
       <p:sp>
         <p:nvSpPr>
-          <p:cNvPr id="6" name="Content Placeholder 5"/>
-          <p:cNvSpPr>
-            <a:spLocks noGrp="1"/>
-          </p:cNvSpPr>
-          <p:nvPr>
-            <p:ph sz="quarter" idx="4"/>
+          <p:cNvPr id="3" name="Slide Number Placeholder 2"/>
+          <p:cNvSpPr>
+            <a:spLocks noGrp="1"/>
+          </p:cNvSpPr>
+          <p:nvPr>
+            <p:ph type="sldNum" sz="quarter" idx="12"/>
+          </p:nvPr>
+        </p:nvSpPr>
+        <p:spPr/>
+        <p:txBody>
+          <a:bodyPr/>
+          <a:lstStyle/>
+          <a:p>
+            <a:fld id="{BDADC32C-81AC-42FD-A247-DF363042D84D}" type="slidenum">
+              <a:rPr lang="en-US" smtClean="0"/>
+              <a:pPr/>
+              <a:t>8</a:t>
+            </a:fld>
+            <a:endParaRPr lang="en-US"/>
+          </a:p>
+        </p:txBody>
+      </p:sp>
+    </p:spTree>
+    <p:extLst>
+      <p:ext uri="{BB962C8B-B14F-4D97-AF65-F5344CB8AC3E}">
+        <p14:creationId xmlns:p14="http://schemas.microsoft.com/office/powerpoint/2010/main" val="2867822760"/>
+      </p:ext>
+    </p:extLst>
+  </p:cSld>
+  <p:clrMapOvr>
+    <a:masterClrMapping/>
+  </p:clrMapOvr>
+  <p:timing>
+    <p:tnLst>
+      <p:par>
+        <p:cTn id="1" dur="indefinite" restart="never" nodeType="tmRoot"/>
+      </p:par>
+    </p:tnLst>
+  </p:timing>
+</p:sld>
+</file>
+
+<file path=ppt/slides/slide9.xml><?xml version="1.0" encoding="utf-8"?>
+<p:sld xmlns:a="http://schemas.openxmlformats.org/drawingml/2006/main" xmlns:r="http://schemas.openxmlformats.org/officeDocument/2006/relationships" xmlns:p="http://schemas.openxmlformats.org/presentationml/2006/main">
+  <p:cSld>
+    <p:spTree>
+      <p:nvGrpSpPr>
+        <p:cNvPr id="1" name=""/>
+        <p:cNvGrpSpPr/>
+        <p:nvPr/>
+      </p:nvGrpSpPr>
+      <p:grpSpPr>
+        <a:xfrm>
+          <a:off x="0" y="0"/>
+          <a:ext cx="0" cy="0"/>
+          <a:chOff x="0" y="0"/>
+          <a:chExt cx="0" cy="0"/>
+        </a:xfrm>
+      </p:grpSpPr>
+      <p:sp>
+        <p:nvSpPr>
+          <p:cNvPr id="2" name="Title 1"/>
+          <p:cNvSpPr>
+            <a:spLocks noGrp="1"/>
+          </p:cNvSpPr>
+          <p:nvPr>
+            <p:ph type="title"/>
+          </p:nvPr>
+        </p:nvSpPr>
+        <p:spPr/>
+        <p:txBody>
+          <a:bodyPr/>
+          <a:lstStyle/>
+          <a:p>
+            <a:r>
+              <a:rPr lang="en-US" dirty="0" smtClean="0">
+                <a:solidFill>
+                  <a:srgbClr val="006E50"/>
+                </a:solidFill>
+              </a:rPr>
+              <a:t>Tools &amp; Resources</a:t>
+            </a:r>
+            <a:endParaRPr lang="en-US" dirty="0">
+              <a:solidFill>
+                <a:srgbClr val="006E50"/>
+              </a:solidFill>
+            </a:endParaRPr>
+          </a:p>
+        </p:txBody>
+      </p:sp>
+      <p:sp>
+        <p:nvSpPr>
+          <p:cNvPr id="8" name="Content Placeholder 7"/>
+          <p:cNvSpPr>
+            <a:spLocks noGrp="1"/>
+          </p:cNvSpPr>
+          <p:nvPr>
+            <p:ph idx="1"/>
           </p:nvPr>
         </p:nvSpPr>
         <p:spPr>
           <a:xfrm>
-            <a:off x="609600" y="2209800"/>
-            <a:ext cx="8153400" cy="4983163"/>
+            <a:off x="457200" y="2514600"/>
+            <a:ext cx="8229600" cy="2057400"/>
           </a:xfrm>
         </p:spPr>
         <p:txBody>
-          <a:bodyPr/>
+          <a:bodyPr>
+            <a:normAutofit/>
+          </a:bodyPr>
           <a:lstStyle/>
           <a:p>
             <a:pPr>
@@ -5742,42 +5796,28 @@
               </a:buClr>
             </a:pPr>
             <a:r>
-              <a:rPr lang="en-US" dirty="0" err="1" smtClean="0">
+              <a:rPr lang="en-US" sz="2400" dirty="0">
+                <a:solidFill>
+                  <a:srgbClr val="006E50"/>
+                </a:solidFill>
+              </a:rPr>
+              <a:t>TypeScript Homepage–</a:t>
+            </a:r>
+            <a:r>
+              <a:rPr lang="en-US" sz="2400" dirty="0">
                 <a:solidFill>
                   <a:srgbClr val="B3D78B"/>
                 </a:solidFill>
               </a:rPr>
-              <a:t>TypeScript</a:t>
-            </a:r>
-            <a:r>
-              <a:rPr lang="en-US" dirty="0" smtClean="0">
-                <a:solidFill>
-                  <a:srgbClr val="B3D78B"/>
-                </a:solidFill>
-              </a:rPr>
-              <a:t> Homepage</a:t>
-            </a:r>
-            <a:r>
-              <a:rPr lang="en-US" dirty="0">
-                <a:solidFill>
-                  <a:srgbClr val="B3D78B"/>
-                </a:solidFill>
-              </a:rPr>
-              <a:t>– </a:t>
-            </a:r>
-            <a:r>
-              <a:rPr lang="en-US" dirty="0">
-                <a:hlinkClick r:id="rId3"/>
-              </a:rPr>
-              <a:t>https://www.typescriptlang.org</a:t>
-            </a:r>
-            <a:r>
-              <a:rPr lang="en-US" dirty="0" smtClean="0">
-                <a:hlinkClick r:id="rId3"/>
-              </a:rPr>
-              <a:t>/</a:t>
-            </a:r>
-            <a:endParaRPr lang="en-US" dirty="0" smtClean="0"/>
+              <a:t> </a:t>
+            </a:r>
+            <a:r>
+              <a:rPr lang="en-US" sz="2400" dirty="0">
+                <a:hlinkClick r:id="rId2"/>
+              </a:rPr>
+              <a:t>https://www.typescriptlang.org/</a:t>
+            </a:r>
+            <a:endParaRPr lang="en-US" sz="2400" dirty="0"/>
           </a:p>
           <a:p>
             <a:pPr>
@@ -5786,42 +5826,36 @@
               </a:buClr>
             </a:pPr>
             <a:r>
-              <a:rPr lang="en-US" dirty="0" err="1" smtClean="0">
+              <a:rPr lang="en-US" sz="2400" dirty="0" err="1">
+                <a:solidFill>
+                  <a:srgbClr val="006E50"/>
+                </a:solidFill>
+              </a:rPr>
+              <a:t>TypEcs</a:t>
+            </a:r>
+            <a:r>
+              <a:rPr lang="en-US" sz="2400" dirty="0">
+                <a:solidFill>
+                  <a:srgbClr val="006E50"/>
+                </a:solidFill>
+              </a:rPr>
+              <a:t> (Eclipse support) -</a:t>
+            </a:r>
+            <a:r>
+              <a:rPr lang="en-US" sz="2400" dirty="0">
                 <a:solidFill>
                   <a:srgbClr val="B3D78B"/>
                 </a:solidFill>
               </a:rPr>
-              <a:t>TypEcs</a:t>
-            </a:r>
-            <a:r>
-              <a:rPr lang="en-US" dirty="0" smtClean="0">
-                <a:solidFill>
-                  <a:srgbClr val="B3D78B"/>
-                </a:solidFill>
-              </a:rPr>
-              <a:t> (Eclipse support) </a:t>
-            </a:r>
-            <a:r>
-              <a:rPr lang="en-US" dirty="0">
-                <a:solidFill>
-                  <a:srgbClr val="B3D78B"/>
-                </a:solidFill>
-              </a:rPr>
-              <a:t>- </a:t>
-            </a:r>
-            <a:r>
-              <a:rPr lang="en-US" dirty="0">
-                <a:hlinkClick r:id="rId4"/>
-              </a:rPr>
-              <a:t>http://typecsdev.com</a:t>
-            </a:r>
-            <a:r>
-              <a:rPr lang="en-US" dirty="0" smtClean="0">
-                <a:hlinkClick r:id="rId4"/>
-              </a:rPr>
-              <a:t>/</a:t>
-            </a:r>
-            <a:endParaRPr lang="en-US" dirty="0" smtClean="0"/>
+              <a:t> </a:t>
+            </a:r>
+            <a:r>
+              <a:rPr lang="en-US" sz="2400" dirty="0">
+                <a:hlinkClick r:id="rId3"/>
+              </a:rPr>
+              <a:t>http://typecsdev.com/</a:t>
+            </a:r>
+            <a:endParaRPr lang="en-US" sz="2400" dirty="0"/>
           </a:p>
           <a:p>
             <a:pPr>
@@ -5830,42 +5864,23 @@
               </a:buClr>
             </a:pPr>
             <a:r>
-              <a:rPr lang="en-US" dirty="0" err="1" smtClean="0">
-                <a:solidFill>
-                  <a:srgbClr val="B3D78B"/>
-                </a:solidFill>
-              </a:rPr>
-              <a:t>TypeScript</a:t>
-            </a:r>
-            <a:r>
-              <a:rPr lang="en-US" dirty="0" smtClean="0">
-                <a:solidFill>
-                  <a:srgbClr val="B3D78B"/>
-                </a:solidFill>
-              </a:rPr>
-              <a:t> on NPM </a:t>
-            </a:r>
-            <a:r>
-              <a:rPr lang="en-US" dirty="0">
-                <a:solidFill>
-                  <a:srgbClr val="B3D78B"/>
-                </a:solidFill>
-              </a:rPr>
-              <a:t>- </a:t>
-            </a:r>
-            <a:r>
-              <a:rPr lang="en-US" dirty="0">
-                <a:hlinkClick r:id="rId5"/>
-              </a:rPr>
-              <a:t>https://</a:t>
-            </a:r>
-            <a:r>
-              <a:rPr lang="en-US" dirty="0" smtClean="0">
-                <a:hlinkClick r:id="rId5"/>
-              </a:rPr>
-              <a:t>www.npmjs.com/package/typescript</a:t>
-            </a:r>
-            <a:endParaRPr lang="en-US" dirty="0" smtClean="0"/>
+              <a:rPr lang="en-US" sz="2400" dirty="0">
+                <a:solidFill>
+                  <a:srgbClr val="006E50"/>
+                </a:solidFill>
+              </a:rPr>
+              <a:t>TypeScript on NPM - </a:t>
+            </a:r>
+            <a:r>
+              <a:rPr lang="en-US" sz="2400" dirty="0">
+                <a:hlinkClick r:id="rId4"/>
+              </a:rPr>
+              <a:t>https://www.npmjs.com/package/typescript</a:t>
+            </a:r>
+            <a:endParaRPr lang="en-US" sz="2400" dirty="0"/>
+          </a:p>
+          <a:p>
+            <a:endParaRPr lang="en-US" sz="2400" dirty="0"/>
           </a:p>
         </p:txBody>
       </p:sp>
@@ -5887,13 +5902,18 @@
             <a:fld id="{BDADC32C-81AC-42FD-A247-DF363042D84D}" type="slidenum">
               <a:rPr lang="en-US" smtClean="0"/>
               <a:pPr/>
-              <a:t>8</a:t>
+              <a:t>9</a:t>
             </a:fld>
             <a:endParaRPr lang="en-US"/>
           </a:p>
         </p:txBody>
       </p:sp>
     </p:spTree>
+    <p:extLst>
+      <p:ext uri="{BB962C8B-B14F-4D97-AF65-F5344CB8AC3E}">
+        <p14:creationId xmlns:p14="http://schemas.microsoft.com/office/powerpoint/2010/main" val="381443347"/>
+      </p:ext>
+    </p:extLst>
   </p:cSld>
   <p:clrMapOvr>
     <a:masterClrMapping/>
@@ -6475,9 +6495,12 @@
 </file>
 
 <file path=customXml/item1.xml><?xml version="1.0" encoding="utf-8"?>
-<p:properties xmlns:p="http://schemas.microsoft.com/office/2006/metadata/properties" xmlns:xsi="http://www.w3.org/2001/XMLSchema-instance">
-  <documentManagement/>
-</p:properties>
+<?mso-contentType ?>
+<FormTemplates xmlns="http://schemas.microsoft.com/sharepoint/v3/contenttype/forms">
+  <Display>DocumentLibraryForm</Display>
+  <Edit>DocumentLibraryForm</Edit>
+  <New>DocumentLibraryForm</New>
+</FormTemplates>
 </file>
 
 <file path=customXml/item2.xml><?xml version="1.0" encoding="utf-8"?>
@@ -6595,25 +6618,15 @@
 </file>
 
 <file path=customXml/item3.xml><?xml version="1.0" encoding="utf-8"?>
-<?mso-contentType ?>
-<FormTemplates xmlns="http://schemas.microsoft.com/sharepoint/v3/contenttype/forms">
-  <Display>DocumentLibraryForm</Display>
-  <Edit>DocumentLibraryForm</Edit>
-  <New>DocumentLibraryForm</New>
-</FormTemplates>
+<p:properties xmlns:p="http://schemas.microsoft.com/office/2006/metadata/properties" xmlns:xsi="http://www.w3.org/2001/XMLSchema-instance">
+  <documentManagement/>
+</p:properties>
 </file>
 
 <file path=customXml/itemProps1.xml><?xml version="1.0" encoding="utf-8"?>
-<ds:datastoreItem xmlns:ds="http://schemas.openxmlformats.org/officeDocument/2006/customXml" ds:itemID="{D2D75FBF-7406-4389-B132-B96E86850097}">
+<ds:datastoreItem xmlns:ds="http://schemas.openxmlformats.org/officeDocument/2006/customXml" ds:itemID="{0501F7DB-99FC-4353-87C7-F3AEA6A0B28E}">
   <ds:schemaRefs>
-    <ds:schemaRef ds:uri="http://schemas.microsoft.com/office/infopath/2007/PartnerControls"/>
-    <ds:schemaRef ds:uri="http://purl.org/dc/elements/1.1/"/>
-    <ds:schemaRef ds:uri="http://www.w3.org/XML/1998/namespace"/>
-    <ds:schemaRef ds:uri="http://schemas.microsoft.com/office/2006/documentManagement/types"/>
-    <ds:schemaRef ds:uri="http://schemas.openxmlformats.org/package/2006/metadata/core-properties"/>
-    <ds:schemaRef ds:uri="http://purl.org/dc/dcmitype/"/>
-    <ds:schemaRef ds:uri="http://schemas.microsoft.com/office/2006/metadata/properties"/>
-    <ds:schemaRef ds:uri="http://purl.org/dc/terms/"/>
+    <ds:schemaRef ds:uri="http://schemas.microsoft.com/sharepoint/v3/contenttype/forms"/>
   </ds:schemaRefs>
 </ds:datastoreItem>
 </file>
@@ -6635,9 +6648,16 @@
 </file>
 
 <file path=customXml/itemProps3.xml><?xml version="1.0" encoding="utf-8"?>
-<ds:datastoreItem xmlns:ds="http://schemas.openxmlformats.org/officeDocument/2006/customXml" ds:itemID="{0501F7DB-99FC-4353-87C7-F3AEA6A0B28E}">
+<ds:datastoreItem xmlns:ds="http://schemas.openxmlformats.org/officeDocument/2006/customXml" ds:itemID="{D2D75FBF-7406-4389-B132-B96E86850097}">
   <ds:schemaRefs>
-    <ds:schemaRef ds:uri="http://schemas.microsoft.com/sharepoint/v3/contenttype/forms"/>
+    <ds:schemaRef ds:uri="http://schemas.microsoft.com/office/infopath/2007/PartnerControls"/>
+    <ds:schemaRef ds:uri="http://purl.org/dc/elements/1.1/"/>
+    <ds:schemaRef ds:uri="http://www.w3.org/XML/1998/namespace"/>
+    <ds:schemaRef ds:uri="http://schemas.microsoft.com/office/2006/documentManagement/types"/>
+    <ds:schemaRef ds:uri="http://schemas.openxmlformats.org/package/2006/metadata/core-properties"/>
+    <ds:schemaRef ds:uri="http://purl.org/dc/dcmitype/"/>
+    <ds:schemaRef ds:uri="http://schemas.microsoft.com/office/2006/metadata/properties"/>
+    <ds:schemaRef ds:uri="http://purl.org/dc/terms/"/>
   </ds:schemaRefs>
 </ds:datastoreItem>
 </file>
</xml_diff>